<commit_message>
Pictures added to prezi
</commit_message>
<xml_diff>
--- a/Szarch-prezi.pptx
+++ b/Szarch-prezi.pptx
@@ -8,12 +8,14 @@
     <p:sldId id="256" r:id="rId2"/>
     <p:sldId id="257" r:id="rId3"/>
     <p:sldId id="258" r:id="rId4"/>
-    <p:sldId id="259" r:id="rId5"/>
-    <p:sldId id="260" r:id="rId6"/>
-    <p:sldId id="263" r:id="rId7"/>
-    <p:sldId id="261" r:id="rId8"/>
-    <p:sldId id="262" r:id="rId9"/>
-    <p:sldId id="264" r:id="rId10"/>
+    <p:sldId id="265" r:id="rId5"/>
+    <p:sldId id="259" r:id="rId6"/>
+    <p:sldId id="260" r:id="rId7"/>
+    <p:sldId id="266" r:id="rId8"/>
+    <p:sldId id="263" r:id="rId9"/>
+    <p:sldId id="261" r:id="rId10"/>
+    <p:sldId id="262" r:id="rId11"/>
+    <p:sldId id="264" r:id="rId12"/>
   </p:sldIdLst>
   <p:sldSz cx="9144000" cy="6858000" type="screen4x3"/>
   <p:notesSz cx="6858000" cy="9144000"/>
@@ -297,7 +299,7 @@
             <a:fld id="{08DCDE75-89FD-47D4-96B5-7D53BD2E92D4}" type="datetimeFigureOut">
               <a:rPr lang="hu-HU" smtClean="0"/>
               <a:pPr/>
-              <a:t>2015.12.01.</a:t>
+              <a:t>2015.12.02.</a:t>
             </a:fld>
             <a:endParaRPr lang="hu-HU"/>
           </a:p>
@@ -464,7 +466,7 @@
             <a:fld id="{08DCDE75-89FD-47D4-96B5-7D53BD2E92D4}" type="datetimeFigureOut">
               <a:rPr lang="hu-HU" smtClean="0"/>
               <a:pPr/>
-              <a:t>2015.12.01.</a:t>
+              <a:t>2015.12.02.</a:t>
             </a:fld>
             <a:endParaRPr lang="hu-HU"/>
           </a:p>
@@ -641,7 +643,7 @@
             <a:fld id="{08DCDE75-89FD-47D4-96B5-7D53BD2E92D4}" type="datetimeFigureOut">
               <a:rPr lang="hu-HU" smtClean="0"/>
               <a:pPr/>
-              <a:t>2015.12.01.</a:t>
+              <a:t>2015.12.02.</a:t>
             </a:fld>
             <a:endParaRPr lang="hu-HU"/>
           </a:p>
@@ -808,7 +810,7 @@
             <a:fld id="{08DCDE75-89FD-47D4-96B5-7D53BD2E92D4}" type="datetimeFigureOut">
               <a:rPr lang="hu-HU" smtClean="0"/>
               <a:pPr/>
-              <a:t>2015.12.01.</a:t>
+              <a:t>2015.12.02.</a:t>
             </a:fld>
             <a:endParaRPr lang="hu-HU"/>
           </a:p>
@@ -1051,7 +1053,7 @@
             <a:fld id="{08DCDE75-89FD-47D4-96B5-7D53BD2E92D4}" type="datetimeFigureOut">
               <a:rPr lang="hu-HU" smtClean="0"/>
               <a:pPr/>
-              <a:t>2015.12.01.</a:t>
+              <a:t>2015.12.02.</a:t>
             </a:fld>
             <a:endParaRPr lang="hu-HU"/>
           </a:p>
@@ -1336,7 +1338,7 @@
             <a:fld id="{08DCDE75-89FD-47D4-96B5-7D53BD2E92D4}" type="datetimeFigureOut">
               <a:rPr lang="hu-HU" smtClean="0"/>
               <a:pPr/>
-              <a:t>2015.12.01.</a:t>
+              <a:t>2015.12.02.</a:t>
             </a:fld>
             <a:endParaRPr lang="hu-HU"/>
           </a:p>
@@ -1755,7 +1757,7 @@
             <a:fld id="{08DCDE75-89FD-47D4-96B5-7D53BD2E92D4}" type="datetimeFigureOut">
               <a:rPr lang="hu-HU" smtClean="0"/>
               <a:pPr/>
-              <a:t>2015.12.01.</a:t>
+              <a:t>2015.12.02.</a:t>
             </a:fld>
             <a:endParaRPr lang="hu-HU"/>
           </a:p>
@@ -1870,7 +1872,7 @@
             <a:fld id="{08DCDE75-89FD-47D4-96B5-7D53BD2E92D4}" type="datetimeFigureOut">
               <a:rPr lang="hu-HU" smtClean="0"/>
               <a:pPr/>
-              <a:t>2015.12.01.</a:t>
+              <a:t>2015.12.02.</a:t>
             </a:fld>
             <a:endParaRPr lang="hu-HU"/>
           </a:p>
@@ -1962,7 +1964,7 @@
             <a:fld id="{08DCDE75-89FD-47D4-96B5-7D53BD2E92D4}" type="datetimeFigureOut">
               <a:rPr lang="hu-HU" smtClean="0"/>
               <a:pPr/>
-              <a:t>2015.12.01.</a:t>
+              <a:t>2015.12.02.</a:t>
             </a:fld>
             <a:endParaRPr lang="hu-HU"/>
           </a:p>
@@ -2236,7 +2238,7 @@
             <a:fld id="{08DCDE75-89FD-47D4-96B5-7D53BD2E92D4}" type="datetimeFigureOut">
               <a:rPr lang="hu-HU" smtClean="0"/>
               <a:pPr/>
-              <a:t>2015.12.01.</a:t>
+              <a:t>2015.12.02.</a:t>
             </a:fld>
             <a:endParaRPr lang="hu-HU"/>
           </a:p>
@@ -2486,7 +2488,7 @@
             <a:fld id="{08DCDE75-89FD-47D4-96B5-7D53BD2E92D4}" type="datetimeFigureOut">
               <a:rPr lang="hu-HU" smtClean="0"/>
               <a:pPr/>
-              <a:t>2015.12.01.</a:t>
+              <a:t>2015.12.02.</a:t>
             </a:fld>
             <a:endParaRPr lang="hu-HU"/>
           </a:p>
@@ -2696,7 +2698,7 @@
             <a:fld id="{08DCDE75-89FD-47D4-96B5-7D53BD2E92D4}" type="datetimeFigureOut">
               <a:rPr lang="hu-HU" smtClean="0"/>
               <a:pPr/>
-              <a:t>2015.12.01.</a:t>
+              <a:t>2015.12.02.</a:t>
             </a:fld>
             <a:endParaRPr lang="hu-HU"/>
           </a:p>
@@ -3143,6 +3145,140 @@
 </p:sld>
 </file>
 
+<file path=ppt/slides/slide10.xml><?xml version="1.0" encoding="utf-8"?>
+<p:sld xmlns:a="http://schemas.openxmlformats.org/drawingml/2006/main" xmlns:r="http://schemas.openxmlformats.org/officeDocument/2006/relationships" xmlns:p="http://schemas.openxmlformats.org/presentationml/2006/main">
+  <p:cSld>
+    <p:spTree>
+      <p:nvGrpSpPr>
+        <p:cNvPr id="1" name=""/>
+        <p:cNvGrpSpPr/>
+        <p:nvPr/>
+      </p:nvGrpSpPr>
+      <p:grpSpPr>
+        <a:xfrm>
+          <a:off x="0" y="0"/>
+          <a:ext cx="0" cy="0"/>
+          <a:chOff x="0" y="0"/>
+          <a:chExt cx="0" cy="0"/>
+        </a:xfrm>
+      </p:grpSpPr>
+      <p:sp>
+        <p:nvSpPr>
+          <p:cNvPr id="2" name="Cím 1"/>
+          <p:cNvSpPr>
+            <a:spLocks noGrp="1"/>
+          </p:cNvSpPr>
+          <p:nvPr>
+            <p:ph type="title"/>
+          </p:nvPr>
+        </p:nvSpPr>
+        <p:spPr/>
+        <p:txBody>
+          <a:bodyPr/>
+          <a:lstStyle/>
+          <a:p>
+            <a:r>
+              <a:rPr lang="hu-HU" dirty="0" err="1" smtClean="0"/>
+              <a:t>Docker</a:t>
+            </a:r>
+            <a:endParaRPr lang="hu-HU" dirty="0"/>
+          </a:p>
+        </p:txBody>
+      </p:sp>
+      <p:sp>
+        <p:nvSpPr>
+          <p:cNvPr id="3" name="Tartalom helye 2"/>
+          <p:cNvSpPr>
+            <a:spLocks noGrp="1"/>
+          </p:cNvSpPr>
+          <p:nvPr>
+            <p:ph idx="1"/>
+          </p:nvPr>
+        </p:nvSpPr>
+        <p:spPr/>
+        <p:txBody>
+          <a:bodyPr/>
+          <a:lstStyle/>
+          <a:p>
+            <a:endParaRPr lang="hu-HU"/>
+          </a:p>
+        </p:txBody>
+      </p:sp>
+    </p:spTree>
+  </p:cSld>
+  <p:clrMapOvr>
+    <a:masterClrMapping/>
+  </p:clrMapOvr>
+</p:sld>
+</file>
+
+<file path=ppt/slides/slide11.xml><?xml version="1.0" encoding="utf-8"?>
+<p:sld xmlns:a="http://schemas.openxmlformats.org/drawingml/2006/main" xmlns:r="http://schemas.openxmlformats.org/officeDocument/2006/relationships" xmlns:p="http://schemas.openxmlformats.org/presentationml/2006/main">
+  <p:cSld>
+    <p:spTree>
+      <p:nvGrpSpPr>
+        <p:cNvPr id="1" name=""/>
+        <p:cNvGrpSpPr/>
+        <p:nvPr/>
+      </p:nvGrpSpPr>
+      <p:grpSpPr>
+        <a:xfrm>
+          <a:off x="0" y="0"/>
+          <a:ext cx="0" cy="0"/>
+          <a:chOff x="0" y="0"/>
+          <a:chExt cx="0" cy="0"/>
+        </a:xfrm>
+      </p:grpSpPr>
+      <p:sp>
+        <p:nvSpPr>
+          <p:cNvPr id="2" name="Cím 1"/>
+          <p:cNvSpPr>
+            <a:spLocks noGrp="1"/>
+          </p:cNvSpPr>
+          <p:nvPr>
+            <p:ph type="title"/>
+          </p:nvPr>
+        </p:nvSpPr>
+        <p:spPr/>
+        <p:txBody>
+          <a:bodyPr/>
+          <a:lstStyle/>
+          <a:p>
+            <a:r>
+              <a:rPr lang="hu-HU" dirty="0" smtClean="0"/>
+              <a:t>Továbbfejlesztési javaslatok</a:t>
+            </a:r>
+            <a:endParaRPr lang="hu-HU" dirty="0"/>
+          </a:p>
+        </p:txBody>
+      </p:sp>
+      <p:sp>
+        <p:nvSpPr>
+          <p:cNvPr id="3" name="Tartalom helye 2"/>
+          <p:cNvSpPr>
+            <a:spLocks noGrp="1"/>
+          </p:cNvSpPr>
+          <p:nvPr>
+            <p:ph idx="1"/>
+          </p:nvPr>
+        </p:nvSpPr>
+        <p:spPr/>
+        <p:txBody>
+          <a:bodyPr/>
+          <a:lstStyle/>
+          <a:p>
+            <a:endParaRPr lang="hu-HU"/>
+          </a:p>
+        </p:txBody>
+      </p:sp>
+    </p:spTree>
+  </p:cSld>
+  <p:clrMapOvr>
+    <a:masterClrMapping/>
+  </p:clrMapOvr>
+</p:sld>
+</file>
+
 <file path=ppt/slides/slide2.xml><?xml version="1.0" encoding="utf-8"?>
 <p:sld xmlns:a="http://schemas.openxmlformats.org/drawingml/2006/main" xmlns:r="http://schemas.openxmlformats.org/officeDocument/2006/relationships" xmlns:p="http://schemas.openxmlformats.org/presentationml/2006/main">
   <p:cSld>
@@ -3265,10 +3401,36 @@
           <a:bodyPr/>
           <a:lstStyle/>
           <a:p>
-            <a:endParaRPr lang="hu-HU"/>
-          </a:p>
-        </p:txBody>
-      </p:sp>
+            <a:endParaRPr lang="hu-HU" dirty="0"/>
+          </a:p>
+        </p:txBody>
+      </p:sp>
+      <p:pic>
+        <p:nvPicPr>
+          <p:cNvPr id="7170" name="Picture 2" descr="https://lh5.googleusercontent.com/57nDRtWfDz9dEcdOPJ1_ddgEk8kqZ16oi57_8BBIDCOQc4pKx9APYnhsU8nJwuecuMpM4wahNyYzyp2ofKymA21K35vacW5YbzonG9gFwcUFmBJUGco1oEgZEYSzF1EEhXLYBuHr"/>
+          <p:cNvPicPr>
+            <a:picLocks noChangeAspect="1" noChangeArrowheads="1"/>
+          </p:cNvPicPr>
+          <p:nvPr/>
+        </p:nvPicPr>
+        <p:blipFill>
+          <a:blip r:embed="rId2"/>
+          <a:srcRect/>
+          <a:stretch>
+            <a:fillRect/>
+          </a:stretch>
+        </p:blipFill>
+        <p:spPr bwMode="auto">
+          <a:xfrm>
+            <a:off x="428596" y="1785926"/>
+            <a:ext cx="8429625" cy="3629025"/>
+          </a:xfrm>
+          <a:prstGeom prst="rect">
+            <a:avLst/>
+          </a:prstGeom>
+          <a:noFill/>
+        </p:spPr>
+      </p:pic>
     </p:spTree>
   </p:cSld>
   <p:clrMapOvr>
@@ -3311,7 +3473,7 @@
           <a:p>
             <a:r>
               <a:rPr lang="hu-HU" dirty="0" smtClean="0"/>
-              <a:t>Java Spring</a:t>
+              <a:t>Architektúra</a:t>
             </a:r>
             <a:endParaRPr lang="hu-HU" dirty="0"/>
           </a:p>
@@ -3332,10 +3494,36 @@
           <a:bodyPr/>
           <a:lstStyle/>
           <a:p>
-            <a:endParaRPr lang="hu-HU"/>
-          </a:p>
-        </p:txBody>
-      </p:sp>
+            <a:endParaRPr lang="hu-HU" dirty="0"/>
+          </a:p>
+        </p:txBody>
+      </p:sp>
+      <p:pic>
+        <p:nvPicPr>
+          <p:cNvPr id="22530" name="Picture 2" descr="https://lh3.googleusercontent.com/UcZ63pztw7x_Jut1cQb0GQsxGD6J616FwhvWrSU99AEcjR02xYUxW9mmHX1093cwyLB1Fol4BRBXIOlBqIZ_K3uw0v0S7WT9mcobRNBk-Sm8wq-e1AvUkgIL4pSivm1AofHXuhQX"/>
+          <p:cNvPicPr>
+            <a:picLocks noChangeAspect="1" noChangeArrowheads="1"/>
+          </p:cNvPicPr>
+          <p:nvPr/>
+        </p:nvPicPr>
+        <p:blipFill>
+          <a:blip r:embed="rId2"/>
+          <a:srcRect/>
+          <a:stretch>
+            <a:fillRect/>
+          </a:stretch>
+        </p:blipFill>
+        <p:spPr bwMode="auto">
+          <a:xfrm>
+            <a:off x="2214546" y="2428868"/>
+            <a:ext cx="3943350" cy="2895601"/>
+          </a:xfrm>
+          <a:prstGeom prst="rect">
+            <a:avLst/>
+          </a:prstGeom>
+          <a:noFill/>
+        </p:spPr>
+      </p:pic>
     </p:spTree>
   </p:cSld>
   <p:clrMapOvr>
@@ -3377,16 +3565,8 @@
           <a:lstStyle/>
           <a:p>
             <a:r>
-              <a:rPr lang="hu-HU" dirty="0" err="1" smtClean="0"/>
-              <a:t>AngularJS</a:t>
-            </a:r>
-            <a:r>
               <a:rPr lang="hu-HU" dirty="0" smtClean="0"/>
-              <a:t>, HTML, </a:t>
-            </a:r>
-            <a:r>
-              <a:rPr lang="hu-HU" dirty="0" err="1" smtClean="0"/>
-              <a:t>BootStrap</a:t>
+              <a:t>Java Spring</a:t>
             </a:r>
             <a:endParaRPr lang="hu-HU" dirty="0"/>
           </a:p>
@@ -3452,8 +3632,16 @@
           <a:lstStyle/>
           <a:p>
             <a:r>
+              <a:rPr lang="hu-HU" dirty="0" err="1" smtClean="0"/>
+              <a:t>AngularJS</a:t>
+            </a:r>
+            <a:r>
               <a:rPr lang="hu-HU" dirty="0" smtClean="0"/>
-              <a:t>Kommunikáció</a:t>
+              <a:t>, HTML, </a:t>
+            </a:r>
+            <a:r>
+              <a:rPr lang="hu-HU" dirty="0" err="1" smtClean="0"/>
+              <a:t>BootStrap</a:t>
             </a:r>
             <a:endParaRPr lang="hu-HU" dirty="0"/>
           </a:p>
@@ -3519,8 +3707,16 @@
           <a:lstStyle/>
           <a:p>
             <a:r>
+              <a:rPr lang="hu-HU" dirty="0" err="1" smtClean="0"/>
+              <a:t>AngularJS</a:t>
+            </a:r>
+            <a:r>
               <a:rPr lang="hu-HU" dirty="0" smtClean="0"/>
-              <a:t>Skálázódás</a:t>
+              <a:t>, HTML, </a:t>
+            </a:r>
+            <a:r>
+              <a:rPr lang="hu-HU" dirty="0" err="1" smtClean="0"/>
+              <a:t>BootStrap</a:t>
             </a:r>
             <a:endParaRPr lang="hu-HU" dirty="0"/>
           </a:p>
@@ -3545,6 +3741,58 @@
           </a:p>
         </p:txBody>
       </p:sp>
+      <p:pic>
+        <p:nvPicPr>
+          <p:cNvPr id="23554" name="Picture 2" descr="login.png"/>
+          <p:cNvPicPr>
+            <a:picLocks noChangeAspect="1" noChangeArrowheads="1"/>
+          </p:cNvPicPr>
+          <p:nvPr/>
+        </p:nvPicPr>
+        <p:blipFill>
+          <a:blip r:embed="rId2"/>
+          <a:srcRect/>
+          <a:stretch>
+            <a:fillRect/>
+          </a:stretch>
+        </p:blipFill>
+        <p:spPr bwMode="auto">
+          <a:xfrm>
+            <a:off x="357158" y="1500174"/>
+            <a:ext cx="8506604" cy="3829042"/>
+          </a:xfrm>
+          <a:prstGeom prst="rect">
+            <a:avLst/>
+          </a:prstGeom>
+          <a:noFill/>
+        </p:spPr>
+      </p:pic>
+      <p:pic>
+        <p:nvPicPr>
+          <p:cNvPr id="23556" name="Picture 4" descr="portal.png"/>
+          <p:cNvPicPr>
+            <a:picLocks noChangeAspect="1" noChangeArrowheads="1"/>
+          </p:cNvPicPr>
+          <p:nvPr/>
+        </p:nvPicPr>
+        <p:blipFill>
+          <a:blip r:embed="rId3"/>
+          <a:srcRect/>
+          <a:stretch>
+            <a:fillRect/>
+          </a:stretch>
+        </p:blipFill>
+        <p:spPr bwMode="auto">
+          <a:xfrm>
+            <a:off x="0" y="1928802"/>
+            <a:ext cx="9166334" cy="4560252"/>
+          </a:xfrm>
+          <a:prstGeom prst="rect">
+            <a:avLst/>
+          </a:prstGeom>
+          <a:noFill/>
+        </p:spPr>
+      </p:pic>
     </p:spTree>
   </p:cSld>
   <p:clrMapOvr>
@@ -3586,8 +3834,8 @@
           <a:lstStyle/>
           <a:p>
             <a:r>
-              <a:rPr lang="hu-HU" dirty="0" err="1" smtClean="0"/>
-              <a:t>Docker</a:t>
+              <a:rPr lang="hu-HU" dirty="0" smtClean="0"/>
+              <a:t>Kommunikáció</a:t>
             </a:r>
             <a:endParaRPr lang="hu-HU" dirty="0"/>
           </a:p>
@@ -3654,7 +3902,7 @@
           <a:p>
             <a:r>
               <a:rPr lang="hu-HU" dirty="0" smtClean="0"/>
-              <a:t>Továbbfejlesztési javaslatok</a:t>
+              <a:t>Skálázódás</a:t>
             </a:r>
             <a:endParaRPr lang="hu-HU" dirty="0"/>
           </a:p>

</xml_diff>

<commit_message>
Added backend stuff to presentation.
</commit_message>
<xml_diff>
--- a/Szarch-prezi.pptx
+++ b/Szarch-prezi.pptx
@@ -10,12 +10,13 @@
     <p:sldId id="258" r:id="rId4"/>
     <p:sldId id="265" r:id="rId5"/>
     <p:sldId id="259" r:id="rId6"/>
-    <p:sldId id="260" r:id="rId7"/>
-    <p:sldId id="266" r:id="rId8"/>
-    <p:sldId id="263" r:id="rId9"/>
-    <p:sldId id="261" r:id="rId10"/>
-    <p:sldId id="262" r:id="rId11"/>
-    <p:sldId id="264" r:id="rId12"/>
+    <p:sldId id="267" r:id="rId7"/>
+    <p:sldId id="260" r:id="rId8"/>
+    <p:sldId id="266" r:id="rId9"/>
+    <p:sldId id="263" r:id="rId10"/>
+    <p:sldId id="261" r:id="rId11"/>
+    <p:sldId id="262" r:id="rId12"/>
+    <p:sldId id="264" r:id="rId13"/>
   </p:sldIdLst>
   <p:sldSz cx="9144000" cy="6858000" type="screen4x3"/>
   <p:notesSz cx="6858000" cy="9144000"/>
@@ -114,6 +115,22 @@
       </a:defRPr>
     </a:lvl9pPr>
   </p:defaultTextStyle>
+  <p:extLst>
+    <p:ext uri="{EFAFB233-063F-42B5-8137-9DF3F51BA10A}">
+      <p15:sldGuideLst xmlns:p15="http://schemas.microsoft.com/office/powerpoint/2012/main">
+        <p15:guide id="1" orient="horz" pos="2160">
+          <p15:clr>
+            <a:srgbClr val="A4A3A4"/>
+          </p15:clr>
+        </p15:guide>
+        <p15:guide id="2" pos="2880">
+          <p15:clr>
+            <a:srgbClr val="A4A3A4"/>
+          </p15:clr>
+        </p15:guide>
+      </p15:sldGuideLst>
+    </p:ext>
+  </p:extLst>
 </p:presentation>
 </file>
 
@@ -299,7 +316,7 @@
             <a:fld id="{08DCDE75-89FD-47D4-96B5-7D53BD2E92D4}" type="datetimeFigureOut">
               <a:rPr lang="hu-HU" smtClean="0"/>
               <a:pPr/>
-              <a:t>2015.12.02.</a:t>
+              <a:t>2015. 12. 03.</a:t>
             </a:fld>
             <a:endParaRPr lang="hu-HU"/>
           </a:p>
@@ -466,7 +483,7 @@
             <a:fld id="{08DCDE75-89FD-47D4-96B5-7D53BD2E92D4}" type="datetimeFigureOut">
               <a:rPr lang="hu-HU" smtClean="0"/>
               <a:pPr/>
-              <a:t>2015.12.02.</a:t>
+              <a:t>2015. 12. 03.</a:t>
             </a:fld>
             <a:endParaRPr lang="hu-HU"/>
           </a:p>
@@ -643,7 +660,7 @@
             <a:fld id="{08DCDE75-89FD-47D4-96B5-7D53BD2E92D4}" type="datetimeFigureOut">
               <a:rPr lang="hu-HU" smtClean="0"/>
               <a:pPr/>
-              <a:t>2015.12.02.</a:t>
+              <a:t>2015. 12. 03.</a:t>
             </a:fld>
             <a:endParaRPr lang="hu-HU"/>
           </a:p>
@@ -810,7 +827,7 @@
             <a:fld id="{08DCDE75-89FD-47D4-96B5-7D53BD2E92D4}" type="datetimeFigureOut">
               <a:rPr lang="hu-HU" smtClean="0"/>
               <a:pPr/>
-              <a:t>2015.12.02.</a:t>
+              <a:t>2015. 12. 03.</a:t>
             </a:fld>
             <a:endParaRPr lang="hu-HU"/>
           </a:p>
@@ -1053,7 +1070,7 @@
             <a:fld id="{08DCDE75-89FD-47D4-96B5-7D53BD2E92D4}" type="datetimeFigureOut">
               <a:rPr lang="hu-HU" smtClean="0"/>
               <a:pPr/>
-              <a:t>2015.12.02.</a:t>
+              <a:t>2015. 12. 03.</a:t>
             </a:fld>
             <a:endParaRPr lang="hu-HU"/>
           </a:p>
@@ -1338,7 +1355,7 @@
             <a:fld id="{08DCDE75-89FD-47D4-96B5-7D53BD2E92D4}" type="datetimeFigureOut">
               <a:rPr lang="hu-HU" smtClean="0"/>
               <a:pPr/>
-              <a:t>2015.12.02.</a:t>
+              <a:t>2015. 12. 03.</a:t>
             </a:fld>
             <a:endParaRPr lang="hu-HU"/>
           </a:p>
@@ -1757,7 +1774,7 @@
             <a:fld id="{08DCDE75-89FD-47D4-96B5-7D53BD2E92D4}" type="datetimeFigureOut">
               <a:rPr lang="hu-HU" smtClean="0"/>
               <a:pPr/>
-              <a:t>2015.12.02.</a:t>
+              <a:t>2015. 12. 03.</a:t>
             </a:fld>
             <a:endParaRPr lang="hu-HU"/>
           </a:p>
@@ -1872,7 +1889,7 @@
             <a:fld id="{08DCDE75-89FD-47D4-96B5-7D53BD2E92D4}" type="datetimeFigureOut">
               <a:rPr lang="hu-HU" smtClean="0"/>
               <a:pPr/>
-              <a:t>2015.12.02.</a:t>
+              <a:t>2015. 12. 03.</a:t>
             </a:fld>
             <a:endParaRPr lang="hu-HU"/>
           </a:p>
@@ -1964,7 +1981,7 @@
             <a:fld id="{08DCDE75-89FD-47D4-96B5-7D53BD2E92D4}" type="datetimeFigureOut">
               <a:rPr lang="hu-HU" smtClean="0"/>
               <a:pPr/>
-              <a:t>2015.12.02.</a:t>
+              <a:t>2015. 12. 03.</a:t>
             </a:fld>
             <a:endParaRPr lang="hu-HU"/>
           </a:p>
@@ -2238,7 +2255,7 @@
             <a:fld id="{08DCDE75-89FD-47D4-96B5-7D53BD2E92D4}" type="datetimeFigureOut">
               <a:rPr lang="hu-HU" smtClean="0"/>
               <a:pPr/>
-              <a:t>2015.12.02.</a:t>
+              <a:t>2015. 12. 03.</a:t>
             </a:fld>
             <a:endParaRPr lang="hu-HU"/>
           </a:p>
@@ -2488,7 +2505,7 @@
             <a:fld id="{08DCDE75-89FD-47D4-96B5-7D53BD2E92D4}" type="datetimeFigureOut">
               <a:rPr lang="hu-HU" smtClean="0"/>
               <a:pPr/>
-              <a:t>2015.12.02.</a:t>
+              <a:t>2015. 12. 03.</a:t>
             </a:fld>
             <a:endParaRPr lang="hu-HU"/>
           </a:p>
@@ -2698,7 +2715,7 @@
             <a:fld id="{08DCDE75-89FD-47D4-96B5-7D53BD2E92D4}" type="datetimeFigureOut">
               <a:rPr lang="hu-HU" smtClean="0"/>
               <a:pPr/>
-              <a:t>2015.12.02.</a:t>
+              <a:t>2015. 12. 03.</a:t>
             </a:fld>
             <a:endParaRPr lang="hu-HU"/>
           </a:p>
@@ -3178,8 +3195,8 @@
           <a:lstStyle/>
           <a:p>
             <a:r>
-              <a:rPr lang="hu-HU" dirty="0" err="1" smtClean="0"/>
-              <a:t>Docker</a:t>
+              <a:rPr lang="hu-HU" dirty="0" smtClean="0"/>
+              <a:t>Skálázódás</a:t>
             </a:r>
             <a:endParaRPr lang="hu-HU" dirty="0"/>
           </a:p>
@@ -3245,6 +3262,73 @@
           <a:lstStyle/>
           <a:p>
             <a:r>
+              <a:rPr lang="hu-HU" dirty="0" err="1" smtClean="0"/>
+              <a:t>Docker</a:t>
+            </a:r>
+            <a:endParaRPr lang="hu-HU" dirty="0"/>
+          </a:p>
+        </p:txBody>
+      </p:sp>
+      <p:sp>
+        <p:nvSpPr>
+          <p:cNvPr id="3" name="Tartalom helye 2"/>
+          <p:cNvSpPr>
+            <a:spLocks noGrp="1"/>
+          </p:cNvSpPr>
+          <p:nvPr>
+            <p:ph idx="1"/>
+          </p:nvPr>
+        </p:nvSpPr>
+        <p:spPr/>
+        <p:txBody>
+          <a:bodyPr/>
+          <a:lstStyle/>
+          <a:p>
+            <a:endParaRPr lang="hu-HU"/>
+          </a:p>
+        </p:txBody>
+      </p:sp>
+    </p:spTree>
+  </p:cSld>
+  <p:clrMapOvr>
+    <a:masterClrMapping/>
+  </p:clrMapOvr>
+</p:sld>
+</file>
+
+<file path=ppt/slides/slide12.xml><?xml version="1.0" encoding="utf-8"?>
+<p:sld xmlns:a="http://schemas.openxmlformats.org/drawingml/2006/main" xmlns:r="http://schemas.openxmlformats.org/officeDocument/2006/relationships" xmlns:p="http://schemas.openxmlformats.org/presentationml/2006/main">
+  <p:cSld>
+    <p:spTree>
+      <p:nvGrpSpPr>
+        <p:cNvPr id="1" name=""/>
+        <p:cNvGrpSpPr/>
+        <p:nvPr/>
+      </p:nvGrpSpPr>
+      <p:grpSpPr>
+        <a:xfrm>
+          <a:off x="0" y="0"/>
+          <a:ext cx="0" cy="0"/>
+          <a:chOff x="0" y="0"/>
+          <a:chExt cx="0" cy="0"/>
+        </a:xfrm>
+      </p:grpSpPr>
+      <p:sp>
+        <p:nvSpPr>
+          <p:cNvPr id="2" name="Cím 1"/>
+          <p:cNvSpPr>
+            <a:spLocks noGrp="1"/>
+          </p:cNvSpPr>
+          <p:nvPr>
+            <p:ph type="title"/>
+          </p:nvPr>
+        </p:nvSpPr>
+        <p:spPr/>
+        <p:txBody>
+          <a:bodyPr/>
+          <a:lstStyle/>
+          <a:p>
+            <a:r>
               <a:rPr lang="hu-HU" dirty="0" smtClean="0"/>
               <a:t>Továbbfejlesztési javaslatok</a:t>
             </a:r>
@@ -3334,7 +3418,51 @@
           <a:bodyPr/>
           <a:lstStyle/>
           <a:p>
-            <a:endParaRPr lang="hu-HU"/>
+            <a:r>
+              <a:rPr lang="hu-HU" dirty="0" smtClean="0"/>
+              <a:t>Projektmenedzsment alkalmazás</a:t>
+            </a:r>
+          </a:p>
+          <a:p>
+            <a:pPr lvl="1"/>
+            <a:r>
+              <a:rPr lang="hu-HU" dirty="0" smtClean="0"/>
+              <a:t>Fapados JIRA klón</a:t>
+            </a:r>
+            <a:endParaRPr lang="hu-HU" dirty="0"/>
+          </a:p>
+          <a:p>
+            <a:r>
+              <a:rPr lang="hu-HU" dirty="0" smtClean="0"/>
+              <a:t>HTML5</a:t>
+            </a:r>
+          </a:p>
+          <a:p>
+            <a:r>
+              <a:rPr lang="hu-HU" dirty="0" smtClean="0"/>
+              <a:t>JVM alapú backend</a:t>
+            </a:r>
+          </a:p>
+          <a:p>
+            <a:r>
+              <a:rPr lang="hu-HU" dirty="0" err="1" smtClean="0"/>
+              <a:t>MongoDB</a:t>
+            </a:r>
+            <a:endParaRPr lang="hu-HU" dirty="0" smtClean="0"/>
+          </a:p>
+          <a:p>
+            <a:r>
+              <a:rPr lang="hu-HU" dirty="0" err="1" smtClean="0"/>
+              <a:t>Memcached</a:t>
+            </a:r>
+            <a:endParaRPr lang="hu-HU" dirty="0" smtClean="0"/>
+          </a:p>
+          <a:p>
+            <a:r>
+              <a:rPr lang="hu-HU" dirty="0" err="1" smtClean="0"/>
+              <a:t>Docker</a:t>
+            </a:r>
+            <a:endParaRPr lang="hu-HU" dirty="0"/>
           </a:p>
         </p:txBody>
       </p:sp>
@@ -3382,25 +3510,6 @@
               <a:rPr lang="hu-HU" dirty="0" smtClean="0"/>
               <a:t>Architektúra</a:t>
             </a:r>
-            <a:endParaRPr lang="hu-HU" dirty="0"/>
-          </a:p>
-        </p:txBody>
-      </p:sp>
-      <p:sp>
-        <p:nvSpPr>
-          <p:cNvPr id="3" name="Tartalom helye 2"/>
-          <p:cNvSpPr>
-            <a:spLocks noGrp="1"/>
-          </p:cNvSpPr>
-          <p:nvPr>
-            <p:ph idx="1"/>
-          </p:nvPr>
-        </p:nvSpPr>
-        <p:spPr/>
-        <p:txBody>
-          <a:bodyPr/>
-          <a:lstStyle/>
-          <a:p>
             <a:endParaRPr lang="hu-HU" dirty="0"/>
           </a:p>
         </p:txBody>
@@ -3473,7 +3582,7 @@
           <a:p>
             <a:r>
               <a:rPr lang="hu-HU" dirty="0" smtClean="0"/>
-              <a:t>Architektúra</a:t>
+              <a:t>Backend</a:t>
             </a:r>
             <a:endParaRPr lang="hu-HU" dirty="0"/>
           </a:p>
@@ -3494,34 +3603,173 @@
           <a:bodyPr/>
           <a:lstStyle/>
           <a:p>
+            <a:r>
+              <a:rPr lang="hu-HU" dirty="0" err="1" smtClean="0"/>
+              <a:t>Groovy</a:t>
+            </a:r>
+            <a:r>
+              <a:rPr lang="hu-HU" dirty="0" smtClean="0"/>
+              <a:t> nyelv</a:t>
+            </a:r>
+          </a:p>
+          <a:p>
+            <a:r>
+              <a:rPr lang="hu-HU" dirty="0" smtClean="0"/>
+              <a:t>Spring </a:t>
+            </a:r>
+            <a:r>
+              <a:rPr lang="hu-HU" dirty="0" err="1" smtClean="0"/>
+              <a:t>framework</a:t>
+            </a:r>
+            <a:endParaRPr lang="hu-HU" dirty="0" smtClean="0"/>
+          </a:p>
+          <a:p>
+            <a:r>
+              <a:rPr lang="hu-HU" dirty="0" smtClean="0"/>
+              <a:t>Spring Boot</a:t>
+            </a:r>
+          </a:p>
+          <a:p>
+            <a:pPr lvl="1"/>
+            <a:r>
+              <a:rPr lang="hu-HU" dirty="0" smtClean="0"/>
+              <a:t>Konfigurációkezelés</a:t>
+            </a:r>
+          </a:p>
+          <a:p>
+            <a:pPr lvl="1"/>
+            <a:r>
+              <a:rPr lang="hu-HU" dirty="0" err="1" smtClean="0"/>
+              <a:t>Embedded</a:t>
+            </a:r>
+            <a:r>
+              <a:rPr lang="hu-HU" dirty="0" smtClean="0"/>
+              <a:t> </a:t>
+            </a:r>
+            <a:r>
+              <a:rPr lang="hu-HU" dirty="0" err="1" smtClean="0"/>
+              <a:t>Tomcat</a:t>
+            </a:r>
+            <a:endParaRPr lang="hu-HU" dirty="0" smtClean="0"/>
+          </a:p>
+          <a:p>
+            <a:r>
+              <a:rPr lang="hu-HU" dirty="0" err="1" smtClean="0"/>
+              <a:t>Gradle</a:t>
+            </a:r>
+            <a:r>
+              <a:rPr lang="hu-HU" dirty="0" smtClean="0"/>
+              <a:t> </a:t>
+            </a:r>
+            <a:r>
+              <a:rPr lang="hu-HU" dirty="0" err="1" smtClean="0"/>
+              <a:t>build</a:t>
+            </a:r>
+            <a:r>
+              <a:rPr lang="hu-HU" dirty="0" smtClean="0"/>
+              <a:t> környezet</a:t>
+            </a:r>
+          </a:p>
+          <a:p>
+            <a:pPr lvl="1"/>
             <a:endParaRPr lang="hu-HU" dirty="0"/>
           </a:p>
         </p:txBody>
       </p:sp>
       <p:pic>
         <p:nvPicPr>
-          <p:cNvPr id="22530" name="Picture 2" descr="https://lh3.googleusercontent.com/UcZ63pztw7x_Jut1cQb0GQsxGD6J616FwhvWrSU99AEcjR02xYUxW9mmHX1093cwyLB1Fol4BRBXIOlBqIZ_K3uw0v0S7WT9mcobRNBk-Sm8wq-e1AvUkgIL4pSivm1AofHXuhQX"/>
+          <p:cNvPr id="4" name="Picture 3"/>
           <p:cNvPicPr>
-            <a:picLocks noChangeAspect="1" noChangeArrowheads="1"/>
+            <a:picLocks noChangeAspect="1"/>
           </p:cNvPicPr>
           <p:nvPr/>
         </p:nvPicPr>
         <p:blipFill>
           <a:blip r:embed="rId2"/>
-          <a:srcRect/>
           <a:stretch>
             <a:fillRect/>
           </a:stretch>
         </p:blipFill>
-        <p:spPr bwMode="auto">
+        <p:spPr>
           <a:xfrm>
-            <a:off x="2214546" y="2428868"/>
-            <a:ext cx="3943350" cy="2895601"/>
+            <a:off x="4427984" y="1700808"/>
+            <a:ext cx="1791136" cy="894078"/>
           </a:xfrm>
           <a:prstGeom prst="rect">
             <a:avLst/>
           </a:prstGeom>
-          <a:noFill/>
+        </p:spPr>
+      </p:pic>
+      <p:pic>
+        <p:nvPicPr>
+          <p:cNvPr id="5" name="Picture 4"/>
+          <p:cNvPicPr>
+            <a:picLocks noChangeAspect="1"/>
+          </p:cNvPicPr>
+          <p:nvPr/>
+        </p:nvPicPr>
+        <p:blipFill>
+          <a:blip r:embed="rId3"/>
+          <a:stretch>
+            <a:fillRect/>
+          </a:stretch>
+        </p:blipFill>
+        <p:spPr>
+          <a:xfrm>
+            <a:off x="5995008" y="2594885"/>
+            <a:ext cx="2880320" cy="908283"/>
+          </a:xfrm>
+          <a:prstGeom prst="rect">
+            <a:avLst/>
+          </a:prstGeom>
+        </p:spPr>
+      </p:pic>
+      <p:pic>
+        <p:nvPicPr>
+          <p:cNvPr id="6" name="Picture 5"/>
+          <p:cNvPicPr>
+            <a:picLocks noChangeAspect="1"/>
+          </p:cNvPicPr>
+          <p:nvPr/>
+        </p:nvPicPr>
+        <p:blipFill>
+          <a:blip r:embed="rId4"/>
+          <a:stretch>
+            <a:fillRect/>
+          </a:stretch>
+        </p:blipFill>
+        <p:spPr>
+          <a:xfrm>
+            <a:off x="4549552" y="3049027"/>
+            <a:ext cx="1256928" cy="1256928"/>
+          </a:xfrm>
+          <a:prstGeom prst="rect">
+            <a:avLst/>
+          </a:prstGeom>
+        </p:spPr>
+      </p:pic>
+      <p:pic>
+        <p:nvPicPr>
+          <p:cNvPr id="7" name="Picture 6"/>
+          <p:cNvPicPr>
+            <a:picLocks noChangeAspect="1"/>
+          </p:cNvPicPr>
+          <p:nvPr/>
+        </p:nvPicPr>
+        <p:blipFill>
+          <a:blip r:embed="rId5"/>
+          <a:stretch>
+            <a:fillRect/>
+          </a:stretch>
+        </p:blipFill>
+        <p:spPr>
+          <a:xfrm>
+            <a:off x="6047670" y="3863181"/>
+            <a:ext cx="2445792" cy="1122187"/>
+          </a:xfrm>
+          <a:prstGeom prst="rect">
+            <a:avLst/>
+          </a:prstGeom>
         </p:spPr>
       </p:pic>
     </p:spTree>
@@ -3565,32 +3813,112 @@
           <a:lstStyle/>
           <a:p>
             <a:r>
+              <a:rPr lang="hu-HU" dirty="0" err="1" smtClean="0"/>
+              <a:t>MongoDB</a:t>
+            </a:r>
+            <a:endParaRPr lang="hu-HU" dirty="0"/>
+          </a:p>
+        </p:txBody>
+      </p:sp>
+      <p:sp>
+        <p:nvSpPr>
+          <p:cNvPr id="3" name="Tartalom helye 2"/>
+          <p:cNvSpPr>
+            <a:spLocks noGrp="1"/>
+          </p:cNvSpPr>
+          <p:nvPr>
+            <p:ph idx="1"/>
+          </p:nvPr>
+        </p:nvSpPr>
+        <p:spPr/>
+        <p:txBody>
+          <a:bodyPr/>
+          <a:lstStyle/>
+          <a:p>
+            <a:r>
               <a:rPr lang="hu-HU" dirty="0" smtClean="0"/>
-              <a:t>Java Spring</a:t>
+              <a:t>Dokumentum orientált adatbázis</a:t>
+            </a:r>
+          </a:p>
+          <a:p>
+            <a:r>
+              <a:rPr lang="hu-HU" dirty="0" smtClean="0"/>
+              <a:t>N</a:t>
+            </a:r>
+            <a:r>
+              <a:rPr lang="en-US" dirty="0" smtClean="0"/>
+              <a:t>a</a:t>
+            </a:r>
+            <a:r>
+              <a:rPr lang="hu-HU" dirty="0" err="1" smtClean="0"/>
+              <a:t>gy</a:t>
+            </a:r>
+            <a:r>
+              <a:rPr lang="hu-HU" dirty="0" smtClean="0"/>
+              <a:t> sebesség</a:t>
+            </a:r>
+          </a:p>
+          <a:p>
+            <a:r>
+              <a:rPr lang="hu-HU" dirty="0" smtClean="0"/>
+              <a:t>Kellemes skálázhatóság</a:t>
+            </a:r>
+          </a:p>
+          <a:p>
+            <a:pPr lvl="1"/>
+            <a:r>
+              <a:rPr lang="hu-HU" dirty="0" smtClean="0"/>
+              <a:t>Replikáció</a:t>
+            </a:r>
+          </a:p>
+          <a:p>
+            <a:pPr lvl="1"/>
+            <a:r>
+              <a:rPr lang="hu-HU" dirty="0" smtClean="0"/>
+              <a:t>Automatikus vezérválasztás</a:t>
+            </a:r>
+          </a:p>
+          <a:p>
+            <a:r>
+              <a:rPr lang="hu-HU" dirty="0" smtClean="0"/>
+              <a:t>Elérés Spring Data </a:t>
+            </a:r>
+            <a:r>
+              <a:rPr lang="hu-HU" dirty="0" err="1" smtClean="0"/>
+              <a:t>MongoDB</a:t>
+            </a:r>
+            <a:r>
+              <a:rPr lang="hu-HU" dirty="0" smtClean="0"/>
+              <a:t>-n keresztül</a:t>
             </a:r>
             <a:endParaRPr lang="hu-HU" dirty="0"/>
           </a:p>
         </p:txBody>
       </p:sp>
-      <p:sp>
-        <p:nvSpPr>
-          <p:cNvPr id="3" name="Tartalom helye 2"/>
-          <p:cNvSpPr>
-            <a:spLocks noGrp="1"/>
-          </p:cNvSpPr>
-          <p:nvPr>
-            <p:ph idx="1"/>
-          </p:nvPr>
-        </p:nvSpPr>
-        <p:spPr/>
-        <p:txBody>
-          <a:bodyPr/>
-          <a:lstStyle/>
-          <a:p>
-            <a:endParaRPr lang="hu-HU"/>
-          </a:p>
-        </p:txBody>
-      </p:sp>
+      <p:pic>
+        <p:nvPicPr>
+          <p:cNvPr id="4" name="Picture 3"/>
+          <p:cNvPicPr>
+            <a:picLocks noChangeAspect="1"/>
+          </p:cNvPicPr>
+          <p:nvPr/>
+        </p:nvPicPr>
+        <p:blipFill>
+          <a:blip r:embed="rId2"/>
+          <a:stretch>
+            <a:fillRect/>
+          </a:stretch>
+        </p:blipFill>
+        <p:spPr>
+          <a:xfrm>
+            <a:off x="5436096" y="2636912"/>
+            <a:ext cx="2963110" cy="986160"/>
+          </a:xfrm>
+          <a:prstGeom prst="rect">
+            <a:avLst/>
+          </a:prstGeom>
+        </p:spPr>
+      </p:pic>
     </p:spTree>
   </p:cSld>
   <p:clrMapOvr>
@@ -3618,6 +3946,187 @@
       </p:grpSpPr>
       <p:sp>
         <p:nvSpPr>
+          <p:cNvPr id="2" name="Title 1"/>
+          <p:cNvSpPr>
+            <a:spLocks noGrp="1"/>
+          </p:cNvSpPr>
+          <p:nvPr>
+            <p:ph type="title"/>
+          </p:nvPr>
+        </p:nvSpPr>
+        <p:spPr/>
+        <p:txBody>
+          <a:bodyPr/>
+          <a:lstStyle/>
+          <a:p>
+            <a:r>
+              <a:rPr lang="en-US" dirty="0" err="1" smtClean="0"/>
+              <a:t>Memcached</a:t>
+            </a:r>
+            <a:endParaRPr lang="en-US" dirty="0"/>
+          </a:p>
+        </p:txBody>
+      </p:sp>
+      <p:sp>
+        <p:nvSpPr>
+          <p:cNvPr id="3" name="Content Placeholder 2"/>
+          <p:cNvSpPr>
+            <a:spLocks noGrp="1"/>
+          </p:cNvSpPr>
+          <p:nvPr>
+            <p:ph idx="1"/>
+          </p:nvPr>
+        </p:nvSpPr>
+        <p:spPr>
+          <a:xfrm>
+            <a:off x="474948" y="1628800"/>
+            <a:ext cx="8229600" cy="4525963"/>
+          </a:xfrm>
+        </p:spPr>
+        <p:txBody>
+          <a:bodyPr/>
+          <a:lstStyle/>
+          <a:p>
+            <a:r>
+              <a:rPr lang="en-US" dirty="0" smtClean="0"/>
+              <a:t>Key-value in-memory cache</a:t>
+            </a:r>
+          </a:p>
+          <a:p>
+            <a:r>
+              <a:rPr lang="en-US" dirty="0" err="1" smtClean="0"/>
+              <a:t>Könnyen</a:t>
+            </a:r>
+            <a:r>
+              <a:rPr lang="en-US" dirty="0" smtClean="0"/>
+              <a:t> </a:t>
+            </a:r>
+            <a:r>
+              <a:rPr lang="en-US" dirty="0" err="1" smtClean="0"/>
+              <a:t>fürtözhető</a:t>
+            </a:r>
+            <a:endParaRPr lang="en-US" dirty="0"/>
+          </a:p>
+          <a:p>
+            <a:r>
+              <a:rPr lang="en-US" dirty="0" err="1" smtClean="0"/>
+              <a:t>Gyk</a:t>
+            </a:r>
+            <a:r>
+              <a:rPr lang="en-US" dirty="0" smtClean="0"/>
+              <a:t>: </a:t>
+            </a:r>
+            <a:r>
+              <a:rPr lang="en-US" dirty="0" err="1" smtClean="0"/>
+              <a:t>Egy</a:t>
+            </a:r>
+            <a:r>
+              <a:rPr lang="en-US" dirty="0" smtClean="0"/>
+              <a:t> </a:t>
+            </a:r>
+            <a:r>
+              <a:rPr lang="en-US" dirty="0" err="1" smtClean="0"/>
+              <a:t>nagy</a:t>
+            </a:r>
+            <a:r>
+              <a:rPr lang="en-US" dirty="0" smtClean="0"/>
+              <a:t> </a:t>
+            </a:r>
+            <a:r>
+              <a:rPr lang="en-US" dirty="0" err="1" smtClean="0"/>
+              <a:t>elosztott</a:t>
+            </a:r>
+            <a:r>
+              <a:rPr lang="en-US" dirty="0" smtClean="0"/>
+              <a:t> hash </a:t>
+            </a:r>
+            <a:r>
+              <a:rPr lang="en-US" dirty="0" err="1" smtClean="0"/>
+              <a:t>tábla</a:t>
+            </a:r>
+            <a:endParaRPr lang="en-US" dirty="0" smtClean="0"/>
+          </a:p>
+          <a:p>
+            <a:r>
+              <a:rPr lang="en-US" dirty="0" err="1" smtClean="0"/>
+              <a:t>Elérés</a:t>
+            </a:r>
+            <a:r>
+              <a:rPr lang="en-US" dirty="0" smtClean="0"/>
+              <a:t> a Spring cache </a:t>
+            </a:r>
+            <a:r>
+              <a:rPr lang="en-US" dirty="0" err="1" smtClean="0"/>
+              <a:t>absztrakcióján</a:t>
+            </a:r>
+            <a:r>
+              <a:rPr lang="en-US" dirty="0" smtClean="0"/>
+              <a:t> </a:t>
+            </a:r>
+            <a:r>
+              <a:rPr lang="en-US" dirty="0" err="1" smtClean="0"/>
+              <a:t>keresztül</a:t>
+            </a:r>
+            <a:endParaRPr lang="en-US" dirty="0" smtClean="0"/>
+          </a:p>
+        </p:txBody>
+      </p:sp>
+      <p:pic>
+        <p:nvPicPr>
+          <p:cNvPr id="5" name="Picture 4"/>
+          <p:cNvPicPr>
+            <a:picLocks noChangeAspect="1"/>
+          </p:cNvPicPr>
+          <p:nvPr/>
+        </p:nvPicPr>
+        <p:blipFill>
+          <a:blip r:embed="rId2"/>
+          <a:stretch>
+            <a:fillRect/>
+          </a:stretch>
+        </p:blipFill>
+        <p:spPr>
+          <a:xfrm>
+            <a:off x="179512" y="5013176"/>
+            <a:ext cx="8820472" cy="1629259"/>
+          </a:xfrm>
+          <a:prstGeom prst="rect">
+            <a:avLst/>
+          </a:prstGeom>
+        </p:spPr>
+      </p:pic>
+    </p:spTree>
+    <p:extLst>
+      <p:ext uri="{BB962C8B-B14F-4D97-AF65-F5344CB8AC3E}">
+        <p14:creationId xmlns:p14="http://schemas.microsoft.com/office/powerpoint/2010/main" val="133220387"/>
+      </p:ext>
+    </p:extLst>
+  </p:cSld>
+  <p:clrMapOvr>
+    <a:masterClrMapping/>
+  </p:clrMapOvr>
+</p:sld>
+</file>
+
+<file path=ppt/slides/slide7.xml><?xml version="1.0" encoding="utf-8"?>
+<p:sld xmlns:a="http://schemas.openxmlformats.org/drawingml/2006/main" xmlns:r="http://schemas.openxmlformats.org/officeDocument/2006/relationships" xmlns:p="http://schemas.openxmlformats.org/presentationml/2006/main">
+  <p:cSld>
+    <p:spTree>
+      <p:nvGrpSpPr>
+        <p:cNvPr id="1" name=""/>
+        <p:cNvGrpSpPr/>
+        <p:nvPr/>
+      </p:nvGrpSpPr>
+      <p:grpSpPr>
+        <a:xfrm>
+          <a:off x="0" y="0"/>
+          <a:ext cx="0" cy="0"/>
+          <a:chOff x="0" y="0"/>
+          <a:chExt cx="0" cy="0"/>
+        </a:xfrm>
+      </p:grpSpPr>
+      <p:sp>
+        <p:nvSpPr>
           <p:cNvPr id="2" name="Cím 1"/>
           <p:cNvSpPr>
             <a:spLocks noGrp="1"/>
@@ -3674,7 +4183,7 @@
 </p:sld>
 </file>
 
-<file path=ppt/slides/slide7.xml><?xml version="1.0" encoding="utf-8"?>
+<file path=ppt/slides/slide8.xml><?xml version="1.0" encoding="utf-8"?>
 <p:sld xmlns:a="http://schemas.openxmlformats.org/drawingml/2006/main" xmlns:r="http://schemas.openxmlformats.org/officeDocument/2006/relationships" xmlns:p="http://schemas.openxmlformats.org/presentationml/2006/main">
   <p:cSld>
     <p:spTree>
@@ -3801,73 +4310,6 @@
 </p:sld>
 </file>
 
-<file path=ppt/slides/slide8.xml><?xml version="1.0" encoding="utf-8"?>
-<p:sld xmlns:a="http://schemas.openxmlformats.org/drawingml/2006/main" xmlns:r="http://schemas.openxmlformats.org/officeDocument/2006/relationships" xmlns:p="http://schemas.openxmlformats.org/presentationml/2006/main">
-  <p:cSld>
-    <p:spTree>
-      <p:nvGrpSpPr>
-        <p:cNvPr id="1" name=""/>
-        <p:cNvGrpSpPr/>
-        <p:nvPr/>
-      </p:nvGrpSpPr>
-      <p:grpSpPr>
-        <a:xfrm>
-          <a:off x="0" y="0"/>
-          <a:ext cx="0" cy="0"/>
-          <a:chOff x="0" y="0"/>
-          <a:chExt cx="0" cy="0"/>
-        </a:xfrm>
-      </p:grpSpPr>
-      <p:sp>
-        <p:nvSpPr>
-          <p:cNvPr id="2" name="Cím 1"/>
-          <p:cNvSpPr>
-            <a:spLocks noGrp="1"/>
-          </p:cNvSpPr>
-          <p:nvPr>
-            <p:ph type="title"/>
-          </p:nvPr>
-        </p:nvSpPr>
-        <p:spPr/>
-        <p:txBody>
-          <a:bodyPr/>
-          <a:lstStyle/>
-          <a:p>
-            <a:r>
-              <a:rPr lang="hu-HU" dirty="0" smtClean="0"/>
-              <a:t>Kommunikáció</a:t>
-            </a:r>
-            <a:endParaRPr lang="hu-HU" dirty="0"/>
-          </a:p>
-        </p:txBody>
-      </p:sp>
-      <p:sp>
-        <p:nvSpPr>
-          <p:cNvPr id="3" name="Tartalom helye 2"/>
-          <p:cNvSpPr>
-            <a:spLocks noGrp="1"/>
-          </p:cNvSpPr>
-          <p:nvPr>
-            <p:ph idx="1"/>
-          </p:nvPr>
-        </p:nvSpPr>
-        <p:spPr/>
-        <p:txBody>
-          <a:bodyPr/>
-          <a:lstStyle/>
-          <a:p>
-            <a:endParaRPr lang="hu-HU"/>
-          </a:p>
-        </p:txBody>
-      </p:sp>
-    </p:spTree>
-  </p:cSld>
-  <p:clrMapOvr>
-    <a:masterClrMapping/>
-  </p:clrMapOvr>
-</p:sld>
-</file>
-
 <file path=ppt/slides/slide9.xml><?xml version="1.0" encoding="utf-8"?>
 <p:sld xmlns:a="http://schemas.openxmlformats.org/drawingml/2006/main" xmlns:r="http://schemas.openxmlformats.org/officeDocument/2006/relationships" xmlns:p="http://schemas.openxmlformats.org/presentationml/2006/main">
   <p:cSld>
@@ -3902,7 +4344,7 @@
           <a:p>
             <a:r>
               <a:rPr lang="hu-HU" dirty="0" smtClean="0"/>
-              <a:t>Skálázódás</a:t>
+              <a:t>Kommunikáció</a:t>
             </a:r>
             <a:endParaRPr lang="hu-HU" dirty="0"/>
           </a:p>

</xml_diff>

<commit_message>
Fixes here and there in prezi
</commit_message>
<xml_diff>
--- a/Szarch-prezi.pptx
+++ b/Szarch-prezi.pptx
@@ -3757,45 +3757,93 @@
           <a:lstStyle/>
           <a:p>
             <a:pPr>
-              <a:buSzPct val="45000"/>
-              <a:buFont typeface="StarSymbol"/>
-              <a:buChar char=""/>
-            </a:pPr>
-            <a:r>
-              <a:rPr lang="hu-HU" sz="3200">
-                <a:latin typeface="Calibri"/>
-              </a:rPr>
-              <a:t>Konténer virtualizációs technika</a:t>
-            </a:r>
-            <a:endParaRPr/>
+              <a:buSzPct val="120000"/>
+              <a:buFont typeface="Arial" pitchFamily="34" charset="0"/>
+              <a:buChar char="•"/>
+            </a:pPr>
+            <a:r>
+              <a:rPr lang="hu-HU" sz="3200" dirty="0">
+                <a:latin typeface="Calibri" pitchFamily="34" charset="0"/>
+              </a:rPr>
+              <a:t>Konténer </a:t>
+            </a:r>
+            <a:r>
+              <a:rPr lang="hu-HU" sz="3200" dirty="0" err="1">
+                <a:latin typeface="Calibri" pitchFamily="34" charset="0"/>
+              </a:rPr>
+              <a:t>virtualizációs</a:t>
+            </a:r>
+            <a:r>
+              <a:rPr lang="hu-HU" sz="3200" dirty="0">
+                <a:latin typeface="Calibri" pitchFamily="34" charset="0"/>
+              </a:rPr>
+              <a:t> technika</a:t>
+            </a:r>
+            <a:endParaRPr>
+              <a:latin typeface="Calibri" pitchFamily="34" charset="0"/>
+            </a:endParaRPr>
           </a:p>
           <a:p>
             <a:pPr>
-              <a:buSzPct val="45000"/>
-              <a:buFont typeface="StarSymbol"/>
-              <a:buChar char=""/>
-            </a:pPr>
-            <a:r>
-              <a:rPr lang="hu-HU" sz="3200">
-                <a:latin typeface="Calibri"/>
-              </a:rPr>
-              <a:t>Gyors deploy</a:t>
-            </a:r>
-            <a:endParaRPr/>
+              <a:buSzPct val="120000"/>
+              <a:buFont typeface="Arial" pitchFamily="34" charset="0"/>
+              <a:buChar char="•"/>
+            </a:pPr>
+            <a:r>
+              <a:rPr lang="hu-HU" sz="3200" dirty="0">
+                <a:latin typeface="Calibri" pitchFamily="34" charset="0"/>
+              </a:rPr>
+              <a:t>Gyors </a:t>
+            </a:r>
+            <a:r>
+              <a:rPr lang="hu-HU" sz="3200" dirty="0" err="1">
+                <a:latin typeface="Calibri" pitchFamily="34" charset="0"/>
+              </a:rPr>
+              <a:t>deploy</a:t>
+            </a:r>
+            <a:endParaRPr>
+              <a:latin typeface="Calibri" pitchFamily="34" charset="0"/>
+            </a:endParaRPr>
           </a:p>
           <a:p>
             <a:pPr>
-              <a:buSzPct val="45000"/>
-              <a:buFont typeface="StarSymbol"/>
-              <a:buChar char=""/>
-            </a:pPr>
-            <a:r>
-              <a:rPr lang="hu-HU" sz="3200">
-                <a:latin typeface="Calibri"/>
-              </a:rPr>
-              <a:t>Host rendszer kernel-e felett hoz létre egy virtuális környezetet</a:t>
-            </a:r>
-            <a:endParaRPr/>
+              <a:buSzPct val="120000"/>
+              <a:buFont typeface="Arial" pitchFamily="34" charset="0"/>
+              <a:buChar char="•"/>
+            </a:pPr>
+            <a:r>
+              <a:rPr lang="hu-HU" sz="3200" dirty="0" err="1">
+                <a:latin typeface="Calibri" pitchFamily="34" charset="0"/>
+              </a:rPr>
+              <a:t>Host</a:t>
+            </a:r>
+            <a:r>
+              <a:rPr lang="hu-HU" sz="3200" dirty="0">
+                <a:latin typeface="Calibri" pitchFamily="34" charset="0"/>
+              </a:rPr>
+              <a:t> rendszer </a:t>
+            </a:r>
+            <a:r>
+              <a:rPr lang="hu-HU" sz="3200" dirty="0" err="1" smtClean="0">
+                <a:latin typeface="Calibri" pitchFamily="34" charset="0"/>
+              </a:rPr>
+              <a:t>kernele</a:t>
+            </a:r>
+            <a:r>
+              <a:rPr lang="hu-HU" sz="3200" dirty="0" smtClean="0">
+                <a:latin typeface="Calibri" pitchFamily="34" charset="0"/>
+              </a:rPr>
+              <a:t> </a:t>
+            </a:r>
+            <a:r>
+              <a:rPr lang="hu-HU" sz="3200" dirty="0">
+                <a:latin typeface="Calibri" pitchFamily="34" charset="0"/>
+              </a:rPr>
+              <a:t>felett hoz létre egy virtuális környezetet</a:t>
+            </a:r>
+            <a:endParaRPr>
+              <a:latin typeface="Calibri" pitchFamily="34" charset="0"/>
+            </a:endParaRPr>
           </a:p>
         </p:txBody>
       </p:sp>
@@ -3958,101 +4006,175 @@
           <a:lstStyle/>
           <a:p>
             <a:pPr>
-              <a:buSzPct val="45000"/>
-              <a:buFont typeface="StarSymbol"/>
-              <a:buChar char=""/>
-            </a:pPr>
-            <a:r>
-              <a:rPr lang="hu-HU" sz="3200">
-                <a:latin typeface="Calibri"/>
+              <a:buSzPct val="120000"/>
+              <a:buFont typeface="Arial" pitchFamily="34" charset="0"/>
+              <a:buChar char="•"/>
+            </a:pPr>
+            <a:r>
+              <a:rPr lang="hu-HU" sz="3200" dirty="0">
+                <a:latin typeface="Calibri" pitchFamily="34" charset="0"/>
               </a:rPr>
               <a:t>Könnyen kiterjeszthető</a:t>
             </a:r>
-            <a:endParaRPr/>
+            <a:endParaRPr>
+              <a:latin typeface="Calibri" pitchFamily="34" charset="0"/>
+            </a:endParaRPr>
           </a:p>
           <a:p>
             <a:pPr lvl="1">
-              <a:buSzPct val="75000"/>
-              <a:buFont typeface="StarSymbol"/>
-              <a:buChar char=""/>
-            </a:pPr>
-            <a:r>
-              <a:rPr lang="hu-HU" sz="2400">
-                <a:latin typeface="Calibri"/>
-              </a:rPr>
-              <a:t>A struktúra mellé a docker konténereknek hála gyorsan allokálhatunk új erőforrást</a:t>
-            </a:r>
-            <a:endParaRPr/>
+              <a:buSzPct val="120000"/>
+              <a:buFont typeface="Arial" pitchFamily="34" charset="0"/>
+              <a:buChar char="•"/>
+            </a:pPr>
+            <a:r>
+              <a:rPr lang="hu-HU" sz="2400" dirty="0">
+                <a:latin typeface="Calibri" pitchFamily="34" charset="0"/>
+              </a:rPr>
+              <a:t>A struktúra mellé a </a:t>
+            </a:r>
+            <a:r>
+              <a:rPr lang="hu-HU" sz="2400" dirty="0" err="1">
+                <a:latin typeface="Calibri" pitchFamily="34" charset="0"/>
+              </a:rPr>
+              <a:t>docker</a:t>
+            </a:r>
+            <a:r>
+              <a:rPr lang="hu-HU" sz="2400" dirty="0">
+                <a:latin typeface="Calibri" pitchFamily="34" charset="0"/>
+              </a:rPr>
+              <a:t> konténereknek hála gyorsan allokálhatunk új erőforrást</a:t>
+            </a:r>
+            <a:endParaRPr>
+              <a:latin typeface="Calibri" pitchFamily="34" charset="0"/>
+            </a:endParaRPr>
           </a:p>
           <a:p>
             <a:pPr>
-              <a:buSzPct val="45000"/>
-              <a:buFont typeface="StarSymbol"/>
-              <a:buChar char=""/>
-            </a:pPr>
-            <a:r>
-              <a:rPr lang="hu-HU" sz="3200">
-                <a:latin typeface="Calibri"/>
+              <a:buSzPct val="120000"/>
+              <a:buFont typeface="Arial" pitchFamily="34" charset="0"/>
+              <a:buChar char="•"/>
+            </a:pPr>
+            <a:r>
+              <a:rPr lang="hu-HU" sz="3200" dirty="0">
+                <a:latin typeface="Calibri" pitchFamily="34" charset="0"/>
               </a:rPr>
               <a:t>Könnyen és gyorsan installálható</a:t>
             </a:r>
-            <a:endParaRPr/>
+            <a:endParaRPr>
+              <a:latin typeface="Calibri" pitchFamily="34" charset="0"/>
+            </a:endParaRPr>
           </a:p>
           <a:p>
             <a:pPr lvl="1">
-              <a:buSzPct val="75000"/>
-              <a:buFont typeface="StarSymbol"/>
-              <a:buChar char=""/>
-            </a:pPr>
-            <a:r>
-              <a:rPr lang="hu-HU" sz="2400">
-                <a:latin typeface="Calibri"/>
-              </a:rPr>
-              <a:t>Az build-elt docker konténerek szinte azonnal elindulnak</a:t>
-            </a:r>
-            <a:endParaRPr/>
+              <a:buSzPct val="120000"/>
+              <a:buFont typeface="Arial" pitchFamily="34" charset="0"/>
+              <a:buChar char="•"/>
+            </a:pPr>
+            <a:r>
+              <a:rPr lang="hu-HU" sz="2400" dirty="0">
+                <a:latin typeface="Calibri" pitchFamily="34" charset="0"/>
+              </a:rPr>
+              <a:t>Az </a:t>
+            </a:r>
+            <a:r>
+              <a:rPr lang="hu-HU" sz="2400" dirty="0" err="1">
+                <a:latin typeface="Calibri" pitchFamily="34" charset="0"/>
+              </a:rPr>
+              <a:t>build-elt</a:t>
+            </a:r>
+            <a:r>
+              <a:rPr lang="hu-HU" sz="2400" dirty="0">
+                <a:latin typeface="Calibri" pitchFamily="34" charset="0"/>
+              </a:rPr>
+              <a:t> </a:t>
+            </a:r>
+            <a:r>
+              <a:rPr lang="hu-HU" sz="2400" dirty="0" err="1">
+                <a:latin typeface="Calibri" pitchFamily="34" charset="0"/>
+              </a:rPr>
+              <a:t>docker</a:t>
+            </a:r>
+            <a:r>
+              <a:rPr lang="hu-HU" sz="2400" dirty="0">
+                <a:latin typeface="Calibri" pitchFamily="34" charset="0"/>
+              </a:rPr>
+              <a:t> konténerek szinte azonnal elindulnak</a:t>
+            </a:r>
+            <a:endParaRPr>
+              <a:latin typeface="Calibri" pitchFamily="34" charset="0"/>
+            </a:endParaRPr>
           </a:p>
           <a:p>
             <a:pPr>
-              <a:buSzPct val="45000"/>
-              <a:buFont typeface="StarSymbol"/>
-              <a:buChar char=""/>
-            </a:pPr>
-            <a:r>
-              <a:rPr lang="hu-HU" sz="3200">
-                <a:latin typeface="Calibri"/>
+              <a:buSzPct val="120000"/>
+              <a:buFont typeface="Arial" pitchFamily="34" charset="0"/>
+              <a:buChar char="•"/>
+            </a:pPr>
+            <a:r>
+              <a:rPr lang="hu-HU" sz="3200" dirty="0">
+                <a:latin typeface="Calibri" pitchFamily="34" charset="0"/>
               </a:rPr>
               <a:t>Fürtözhető</a:t>
             </a:r>
-            <a:endParaRPr/>
+            <a:endParaRPr>
+              <a:latin typeface="Calibri" pitchFamily="34" charset="0"/>
+            </a:endParaRPr>
           </a:p>
           <a:p>
             <a:pPr lvl="1">
-              <a:buSzPct val="75000"/>
-              <a:buFont typeface="StarSymbol"/>
-              <a:buChar char=""/>
-            </a:pPr>
-            <a:r>
-              <a:rPr lang="hu-HU" sz="2400">
-                <a:latin typeface="Calibri"/>
-              </a:rPr>
-              <a:t>Nginx load balance</a:t>
-            </a:r>
-            <a:endParaRPr/>
+              <a:buSzPct val="120000"/>
+              <a:buFont typeface="Arial" pitchFamily="34" charset="0"/>
+              <a:buChar char="•"/>
+            </a:pPr>
+            <a:r>
+              <a:rPr lang="hu-HU" sz="2400" dirty="0" err="1">
+                <a:latin typeface="Calibri" pitchFamily="34" charset="0"/>
+              </a:rPr>
+              <a:t>Nginx</a:t>
+            </a:r>
+            <a:r>
+              <a:rPr lang="hu-HU" sz="2400" dirty="0">
+                <a:latin typeface="Calibri" pitchFamily="34" charset="0"/>
+              </a:rPr>
+              <a:t> </a:t>
+            </a:r>
+            <a:r>
+              <a:rPr lang="hu-HU" sz="2400" dirty="0" err="1">
+                <a:latin typeface="Calibri" pitchFamily="34" charset="0"/>
+              </a:rPr>
+              <a:t>load</a:t>
+            </a:r>
+            <a:r>
+              <a:rPr lang="hu-HU" sz="2400" dirty="0">
+                <a:latin typeface="Calibri" pitchFamily="34" charset="0"/>
+              </a:rPr>
+              <a:t> </a:t>
+            </a:r>
+            <a:r>
+              <a:rPr lang="hu-HU" sz="2400" dirty="0" err="1">
+                <a:latin typeface="Calibri" pitchFamily="34" charset="0"/>
+              </a:rPr>
+              <a:t>balance</a:t>
+            </a:r>
+            <a:endParaRPr>
+              <a:latin typeface="Calibri" pitchFamily="34" charset="0"/>
+            </a:endParaRPr>
           </a:p>
           <a:p>
             <a:pPr>
-              <a:buSzPct val="45000"/>
-              <a:buFont typeface="StarSymbol"/>
-              <a:buChar char=""/>
-            </a:pPr>
-            <a:r>
-              <a:rPr lang="hu-HU" sz="3200">
-                <a:latin typeface="Calibri"/>
+              <a:buSzPct val="120000"/>
+              <a:buFont typeface="Arial" pitchFamily="34" charset="0"/>
+              <a:buChar char="•"/>
+            </a:pPr>
+            <a:r>
+              <a:rPr lang="hu-HU" sz="3200" dirty="0">
+                <a:latin typeface="Calibri" pitchFamily="34" charset="0"/>
               </a:rPr>
               <a:t>Felhőre kész</a:t>
             </a:r>
-            <a:endParaRPr/>
+            <a:endParaRPr>
+              <a:latin typeface="Calibri" pitchFamily="34" charset="0"/>
+            </a:endParaRPr>
           </a:p>
         </p:txBody>
       </p:sp>
@@ -4165,45 +4287,87 @@
           <a:lstStyle/>
           <a:p>
             <a:pPr>
-              <a:buSzPct val="45000"/>
-              <a:buFont typeface="StarSymbol"/>
-              <a:buChar char=""/>
-            </a:pPr>
-            <a:r>
-              <a:rPr lang="hu-HU" sz="3200">
-                <a:latin typeface="Calibri"/>
-              </a:rPr>
-              <a:t>Új felhasználói role-ok</a:t>
-            </a:r>
-            <a:endParaRPr/>
+              <a:buSzPct val="120000"/>
+              <a:buFont typeface="Arial" pitchFamily="34" charset="0"/>
+              <a:buChar char="•"/>
+            </a:pPr>
+            <a:r>
+              <a:rPr lang="hu-HU" sz="3200" dirty="0">
+                <a:latin typeface="Calibri" pitchFamily="34" charset="0"/>
+              </a:rPr>
+              <a:t>Új felhasználói </a:t>
+            </a:r>
+            <a:r>
+              <a:rPr lang="hu-HU" sz="3200" dirty="0" err="1">
+                <a:latin typeface="Calibri" pitchFamily="34" charset="0"/>
+              </a:rPr>
+              <a:t>role-ok</a:t>
+            </a:r>
+            <a:endParaRPr>
+              <a:latin typeface="Calibri" pitchFamily="34" charset="0"/>
+            </a:endParaRPr>
           </a:p>
           <a:p>
             <a:pPr>
-              <a:buSzPct val="45000"/>
-              <a:buFont typeface="StarSymbol"/>
-              <a:buChar char=""/>
-            </a:pPr>
-            <a:r>
-              <a:rPr lang="hu-HU" sz="3200">
-                <a:latin typeface="Calibri"/>
-              </a:rPr>
-              <a:t>Scrum és kanban board (mint Jirában)</a:t>
-            </a:r>
-            <a:endParaRPr/>
+              <a:buSzPct val="120000"/>
+              <a:buFont typeface="Arial" pitchFamily="34" charset="0"/>
+              <a:buChar char="•"/>
+            </a:pPr>
+            <a:r>
+              <a:rPr lang="hu-HU" sz="3200" dirty="0" err="1">
+                <a:latin typeface="Calibri" pitchFamily="34" charset="0"/>
+              </a:rPr>
+              <a:t>Scrum</a:t>
+            </a:r>
+            <a:r>
+              <a:rPr lang="hu-HU" sz="3200" dirty="0">
+                <a:latin typeface="Calibri" pitchFamily="34" charset="0"/>
+              </a:rPr>
+              <a:t> és kanban </a:t>
+            </a:r>
+            <a:r>
+              <a:rPr lang="hu-HU" sz="3200" dirty="0" err="1">
+                <a:latin typeface="Calibri" pitchFamily="34" charset="0"/>
+              </a:rPr>
+              <a:t>board</a:t>
+            </a:r>
+            <a:r>
+              <a:rPr lang="hu-HU" sz="3200" dirty="0">
+                <a:latin typeface="Calibri" pitchFamily="34" charset="0"/>
+              </a:rPr>
+              <a:t> (mint </a:t>
+            </a:r>
+            <a:r>
+              <a:rPr lang="hu-HU" sz="3200" dirty="0" err="1">
+                <a:latin typeface="Calibri" pitchFamily="34" charset="0"/>
+              </a:rPr>
+              <a:t>Jirában</a:t>
+            </a:r>
+            <a:r>
+              <a:rPr lang="hu-HU" sz="3200" dirty="0">
+                <a:latin typeface="Calibri" pitchFamily="34" charset="0"/>
+              </a:rPr>
+              <a:t>)</a:t>
+            </a:r>
+            <a:endParaRPr>
+              <a:latin typeface="Calibri" pitchFamily="34" charset="0"/>
+            </a:endParaRPr>
           </a:p>
           <a:p>
             <a:pPr>
-              <a:buSzPct val="45000"/>
-              <a:buFont typeface="StarSymbol"/>
-              <a:buChar char=""/>
-            </a:pPr>
-            <a:r>
-              <a:rPr lang="hu-HU" sz="3200">
-                <a:latin typeface="Calibri"/>
+              <a:buSzPct val="120000"/>
+              <a:buFont typeface="Arial" pitchFamily="34" charset="0"/>
+              <a:buChar char="•"/>
+            </a:pPr>
+            <a:r>
+              <a:rPr lang="hu-HU" sz="3200" dirty="0">
+                <a:latin typeface="Calibri" pitchFamily="34" charset="0"/>
               </a:rPr>
               <a:t>Jogosultság kezelés konfigurálhatóvá tétele</a:t>
             </a:r>
-            <a:endParaRPr/>
+            <a:endParaRPr>
+              <a:latin typeface="Calibri" pitchFamily="34" charset="0"/>
+            </a:endParaRPr>
           </a:p>
         </p:txBody>
       </p:sp>
@@ -5005,7 +5169,7 @@
               <a:buChar char="•"/>
             </a:pPr>
             <a:r>
-              <a:rPr lang="hu-HU" sz="3200">
+              <a:rPr lang="hu-HU" sz="3200" dirty="0">
                 <a:solidFill>
                   <a:srgbClr val="000000"/>
                 </a:solidFill>
@@ -5024,7 +5188,7 @@
               <a:buChar char="•"/>
             </a:pPr>
             <a:r>
-              <a:rPr lang="hu-HU" sz="3200">
+              <a:rPr lang="hu-HU" sz="3200" dirty="0">
                 <a:solidFill>
                   <a:srgbClr val="000000"/>
                 </a:solidFill>
@@ -5043,7 +5207,7 @@
               <a:buChar char="•"/>
             </a:pPr>
             <a:r>
-              <a:rPr lang="hu-HU" sz="3200">
+              <a:rPr lang="hu-HU" sz="3200" dirty="0">
                 <a:solidFill>
                   <a:srgbClr val="000000"/>
                 </a:solidFill>
@@ -5062,7 +5226,7 @@
               <a:buChar char="–"/>
             </a:pPr>
             <a:r>
-              <a:rPr lang="hu-HU" sz="2800">
+              <a:rPr lang="hu-HU" sz="2800" dirty="0" err="1">
                 <a:solidFill>
                   <a:srgbClr val="000000"/>
                 </a:solidFill>
@@ -5081,7 +5245,7 @@
               <a:buChar char="–"/>
             </a:pPr>
             <a:r>
-              <a:rPr lang="hu-HU" sz="2800">
+              <a:rPr lang="hu-HU" sz="2800" dirty="0">
                 <a:solidFill>
                   <a:srgbClr val="000000"/>
                 </a:solidFill>
@@ -5100,13 +5264,31 @@
               <a:buChar char="•"/>
             </a:pPr>
             <a:r>
-              <a:rPr lang="hu-HU" sz="3200">
+              <a:rPr lang="hu-HU" sz="3200" dirty="0">
                 <a:solidFill>
                   <a:srgbClr val="000000"/>
                 </a:solidFill>
                 <a:latin typeface="Calibri"/>
               </a:rPr>
-              <a:t>Elérés Spring Data MongoDB-n keresztül</a:t>
+              <a:t>Elérés Spring Data </a:t>
+            </a:r>
+            <a:r>
+              <a:rPr lang="hu-HU" sz="3200" dirty="0" err="1">
+                <a:solidFill>
+                  <a:srgbClr val="000000"/>
+                </a:solidFill>
+                <a:latin typeface="Calibri"/>
+              </a:rPr>
+              <a:t>MongoDB-n</a:t>
+            </a:r>
+            <a:r>
+              <a:rPr lang="hu-HU" sz="3200" dirty="0">
+                <a:solidFill>
+                  <a:srgbClr val="000000"/>
+                </a:solidFill>
+                <a:latin typeface="Calibri"/>
+              </a:rPr>
+              <a:t> keresztül</a:t>
             </a:r>
             <a:endParaRPr/>
           </a:p>
@@ -5424,13 +5606,31 @@
               </a:lnSpc>
             </a:pPr>
             <a:r>
-              <a:rPr lang="hu-HU" sz="4400">
+              <a:rPr lang="hu-HU" sz="4400" dirty="0" err="1">
                 <a:solidFill>
                   <a:srgbClr val="000000"/>
                 </a:solidFill>
                 <a:latin typeface="Calibri"/>
               </a:rPr>
-              <a:t>AngularJS, HTML, BootStrap</a:t>
+              <a:t>AngularJS</a:t>
+            </a:r>
+            <a:r>
+              <a:rPr lang="hu-HU" sz="4400" dirty="0">
+                <a:solidFill>
+                  <a:srgbClr val="000000"/>
+                </a:solidFill>
+                <a:latin typeface="Calibri"/>
+              </a:rPr>
+              <a:t>, HTML, </a:t>
+            </a:r>
+            <a:r>
+              <a:rPr lang="hu-HU" sz="4400" dirty="0" err="1" smtClean="0">
+                <a:solidFill>
+                  <a:srgbClr val="000000"/>
+                </a:solidFill>
+                <a:latin typeface="Calibri"/>
+              </a:rPr>
+              <a:t>Bootstrap</a:t>
             </a:r>
             <a:endParaRPr/>
           </a:p>
@@ -5456,87 +5656,153 @@
           <a:lstStyle/>
           <a:p>
             <a:pPr>
-              <a:buSzPct val="45000"/>
-              <a:buFont typeface="StarSymbol"/>
-              <a:buChar char=""/>
-            </a:pPr>
-            <a:r>
-              <a:rPr lang="hu-HU" sz="3200">
-                <a:latin typeface="Calibri"/>
-              </a:rPr>
-              <a:t>JavaScript – Angular</a:t>
-            </a:r>
-            <a:endParaRPr/>
+              <a:buSzPct val="120000"/>
+              <a:buFont typeface="Arial" pitchFamily="34" charset="0"/>
+              <a:buChar char="•"/>
+            </a:pPr>
+            <a:r>
+              <a:rPr lang="hu-HU" sz="3200" dirty="0" smtClean="0">
+                <a:latin typeface="Calibri" pitchFamily="34" charset="0"/>
+              </a:rPr>
+              <a:t>JavaScript </a:t>
+            </a:r>
+            <a:r>
+              <a:rPr lang="hu-HU" sz="3200" dirty="0">
+                <a:latin typeface="Calibri" pitchFamily="34" charset="0"/>
+              </a:rPr>
+              <a:t>– </a:t>
+            </a:r>
+            <a:r>
+              <a:rPr lang="hu-HU" sz="3200" dirty="0" err="1" smtClean="0">
+                <a:latin typeface="Calibri" pitchFamily="34" charset="0"/>
+              </a:rPr>
+              <a:t>Angular</a:t>
+            </a:r>
+            <a:endParaRPr lang="hu-HU" sz="3200" dirty="0">
+              <a:latin typeface="Calibri" pitchFamily="34" charset="0"/>
+            </a:endParaRPr>
           </a:p>
           <a:p>
             <a:pPr lvl="1">
-              <a:buSzPct val="75000"/>
-              <a:buFont typeface="StarSymbol"/>
-              <a:buChar char=""/>
-            </a:pPr>
-            <a:r>
-              <a:rPr lang="hu-HU" sz="2400">
-                <a:latin typeface="Calibri"/>
-              </a:rPr>
-              <a:t>Google, MVC architectúra</a:t>
-            </a:r>
-            <a:endParaRPr/>
+              <a:buSzPct val="120000"/>
+              <a:buFont typeface="Arial" pitchFamily="34" charset="0"/>
+              <a:buChar char="•"/>
+            </a:pPr>
+            <a:r>
+              <a:rPr lang="hu-HU" sz="2400" dirty="0" err="1" smtClean="0">
+                <a:latin typeface="Calibri" pitchFamily="34" charset="0"/>
+              </a:rPr>
+              <a:t>Google</a:t>
+            </a:r>
+            <a:r>
+              <a:rPr lang="hu-HU" sz="2400" dirty="0">
+                <a:latin typeface="Calibri" pitchFamily="34" charset="0"/>
+              </a:rPr>
+              <a:t>, MVC </a:t>
+            </a:r>
+            <a:r>
+              <a:rPr lang="hu-HU" sz="2400" dirty="0" err="1">
+                <a:latin typeface="Calibri" pitchFamily="34" charset="0"/>
+              </a:rPr>
+              <a:t>architectúra</a:t>
+            </a:r>
+            <a:endParaRPr>
+              <a:latin typeface="Calibri" pitchFamily="34" charset="0"/>
+            </a:endParaRPr>
           </a:p>
           <a:p>
             <a:pPr>
-              <a:buSzPct val="45000"/>
-              <a:buFont typeface="StarSymbol"/>
-              <a:buChar char=""/>
-            </a:pPr>
-            <a:r>
-              <a:rPr lang="hu-HU" sz="3200">
-                <a:latin typeface="Calibri"/>
+              <a:buSzPct val="120000"/>
+              <a:buFont typeface="Arial" pitchFamily="34" charset="0"/>
+              <a:buChar char="•"/>
+            </a:pPr>
+            <a:r>
+              <a:rPr lang="hu-HU" sz="3200" dirty="0">
+                <a:latin typeface="Calibri" pitchFamily="34" charset="0"/>
               </a:rPr>
               <a:t>Statikus oldal – HTML</a:t>
             </a:r>
-            <a:endParaRPr/>
+            <a:endParaRPr>
+              <a:latin typeface="Calibri" pitchFamily="34" charset="0"/>
+            </a:endParaRPr>
           </a:p>
           <a:p>
             <a:pPr lvl="1">
-              <a:buSzPct val="75000"/>
-              <a:buFont typeface="StarSymbol"/>
-              <a:buChar char=""/>
-            </a:pPr>
-            <a:r>
-              <a:rPr lang="hu-HU" sz="2400">
-                <a:latin typeface="Calibri"/>
-              </a:rPr>
-              <a:t>Web content és angular kötések</a:t>
-            </a:r>
-            <a:endParaRPr/>
+              <a:buSzPct val="120000"/>
+              <a:buFont typeface="Arial" pitchFamily="34" charset="0"/>
+              <a:buChar char="•"/>
+            </a:pPr>
+            <a:r>
+              <a:rPr lang="hu-HU" sz="2400" dirty="0">
+                <a:latin typeface="Calibri" pitchFamily="34" charset="0"/>
+              </a:rPr>
+              <a:t>Web </a:t>
+            </a:r>
+            <a:r>
+              <a:rPr lang="hu-HU" sz="2400" dirty="0" err="1">
+                <a:latin typeface="Calibri" pitchFamily="34" charset="0"/>
+              </a:rPr>
+              <a:t>content</a:t>
+            </a:r>
+            <a:r>
+              <a:rPr lang="hu-HU" sz="2400" dirty="0">
+                <a:latin typeface="Calibri" pitchFamily="34" charset="0"/>
+              </a:rPr>
+              <a:t> és </a:t>
+            </a:r>
+            <a:r>
+              <a:rPr lang="hu-HU" sz="2400" dirty="0" err="1">
+                <a:latin typeface="Calibri" pitchFamily="34" charset="0"/>
+              </a:rPr>
+              <a:t>angular</a:t>
+            </a:r>
+            <a:r>
+              <a:rPr lang="hu-HU" sz="2400" dirty="0">
+                <a:latin typeface="Calibri" pitchFamily="34" charset="0"/>
+              </a:rPr>
+              <a:t> kötések</a:t>
+            </a:r>
+            <a:endParaRPr>
+              <a:latin typeface="Calibri" pitchFamily="34" charset="0"/>
+            </a:endParaRPr>
           </a:p>
           <a:p>
             <a:pPr>
-              <a:buSzPct val="45000"/>
-              <a:buFont typeface="StarSymbol"/>
-              <a:buChar char=""/>
-            </a:pPr>
-            <a:r>
-              <a:rPr lang="hu-HU" sz="3200">
-                <a:latin typeface="Calibri"/>
-              </a:rPr>
-              <a:t>Stílus – Bootstrap</a:t>
-            </a:r>
-            <a:endParaRPr/>
+              <a:buSzPct val="120000"/>
+              <a:buFont typeface="Arial" pitchFamily="34" charset="0"/>
+              <a:buChar char="•"/>
+            </a:pPr>
+            <a:r>
+              <a:rPr lang="hu-HU" sz="3200" dirty="0">
+                <a:latin typeface="Calibri" pitchFamily="34" charset="0"/>
+              </a:rPr>
+              <a:t>Stílus – </a:t>
+            </a:r>
+            <a:r>
+              <a:rPr lang="hu-HU" sz="3200" dirty="0" err="1">
+                <a:latin typeface="Calibri" pitchFamily="34" charset="0"/>
+              </a:rPr>
+              <a:t>Bootstrap</a:t>
+            </a:r>
+            <a:endParaRPr>
+              <a:latin typeface="Calibri" pitchFamily="34" charset="0"/>
+            </a:endParaRPr>
           </a:p>
           <a:p>
             <a:pPr lvl="1">
-              <a:buSzPct val="75000"/>
-              <a:buFont typeface="StarSymbol"/>
-              <a:buChar char=""/>
-            </a:pPr>
-            <a:r>
-              <a:rPr lang="hu-HU" sz="2400">
-                <a:latin typeface="Calibri"/>
+              <a:buSzPct val="120000"/>
+              <a:buFont typeface="Arial" pitchFamily="34" charset="0"/>
+              <a:buChar char="•"/>
+            </a:pPr>
+            <a:r>
+              <a:rPr lang="hu-HU" sz="2400" dirty="0">
+                <a:latin typeface="Calibri" pitchFamily="34" charset="0"/>
               </a:rPr>
               <a:t>Standardizált stílus osztályok, és implementált áttűnések</a:t>
             </a:r>
-            <a:endParaRPr/>
+            <a:endParaRPr>
+              <a:latin typeface="Calibri" pitchFamily="34" charset="0"/>
+            </a:endParaRPr>
           </a:p>
         </p:txBody>
       </p:sp>

</xml_diff>